<commit_message>
Precisazioni cancellazioni elemento funzione
</commit_message>
<xml_diff>
--- a/Tutorato 8 - 10.01/Tutorato 8.pptx
+++ b/Tutorato 8 - 10.01/Tutorato 8.pptx
@@ -3169,10 +3169,10 @@
       </p:sp>
       <p:pic>
         <p:nvPicPr>
-          <p:cNvPr id="6" name="Immagine 5">
-            <a:extLst>
-              <a:ext uri="{FF2B5EF4-FFF2-40B4-BE49-F238E27FC236}">
-                <a16:creationId xmlns:a16="http://schemas.microsoft.com/office/drawing/2014/main" id="{62BBED25-6B3F-1E53-83D8-CE973731208E}"/>
+          <p:cNvPr id="5" name="Immagine 4">
+            <a:extLst>
+              <a:ext uri="{FF2B5EF4-FFF2-40B4-BE49-F238E27FC236}">
+                <a16:creationId xmlns:a16="http://schemas.microsoft.com/office/drawing/2014/main" id="{49153807-EC1B-E3E8-6F7C-0717814B78C2}"/>
               </a:ext>
             </a:extLst>
           </p:cNvPr>
@@ -3189,8 +3189,8 @@
         </p:blipFill>
         <p:spPr>
           <a:xfrm>
-            <a:off x="308240" y="1339820"/>
-            <a:ext cx="8527519" cy="4473328"/>
+            <a:off x="746668" y="1516933"/>
+            <a:ext cx="7788315" cy="4237087"/>
           </a:xfrm>
           <a:prstGeom prst="rect">
             <a:avLst/>

</xml_diff>

<commit_message>
Correzioni su osservazioni sottotipi (pdf + slides)
</commit_message>
<xml_diff>
--- a/Tutorato 8 - 10.01/Tutorato 8.pptx
+++ b/Tutorato 8 - 10.01/Tutorato 8.pptx
@@ -219,7 +219,7 @@
           <a:p>
             <a:fld id="{0E4AAC6D-2322-45B9-8ECA-34DF280B0776}" type="datetimeFigureOut">
               <a:rPr lang="en-US" smtClean="0"/>
-              <a:t>1/10/2024</a:t>
+              <a:t>1/18/2024</a:t>
             </a:fld>
             <a:endParaRPr lang="en-US"/>
           </a:p>
@@ -2877,10 +2877,10 @@
       </p:sp>
       <p:pic>
         <p:nvPicPr>
-          <p:cNvPr id="6" name="Immagine 5">
-            <a:extLst>
-              <a:ext uri="{FF2B5EF4-FFF2-40B4-BE49-F238E27FC236}">
-                <a16:creationId xmlns:a16="http://schemas.microsoft.com/office/drawing/2014/main" id="{617B959E-67E0-6ACD-7515-B9A63572AFC3}"/>
+          <p:cNvPr id="5" name="Immagine 4">
+            <a:extLst>
+              <a:ext uri="{FF2B5EF4-FFF2-40B4-BE49-F238E27FC236}">
+                <a16:creationId xmlns:a16="http://schemas.microsoft.com/office/drawing/2014/main" id="{770C696F-9313-CB24-D4FD-37413CEA61E0}"/>
               </a:ext>
             </a:extLst>
           </p:cNvPr>
@@ -2897,8 +2897,8 @@
         </p:blipFill>
         <p:spPr>
           <a:xfrm>
-            <a:off x="1632796" y="1950592"/>
-            <a:ext cx="2240474" cy="2956816"/>
+            <a:off x="835831" y="1668627"/>
+            <a:ext cx="2438611" cy="3520745"/>
           </a:xfrm>
           <a:prstGeom prst="rect">
             <a:avLst/>
@@ -2907,10 +2907,10 @@
       </p:pic>
       <p:pic>
         <p:nvPicPr>
-          <p:cNvPr id="8" name="Immagine 7">
-            <a:extLst>
-              <a:ext uri="{FF2B5EF4-FFF2-40B4-BE49-F238E27FC236}">
-                <a16:creationId xmlns:a16="http://schemas.microsoft.com/office/drawing/2014/main" id="{DF9AAFAD-C154-4533-BC6E-F52AE74A1F51}"/>
+          <p:cNvPr id="9" name="Immagine 8">
+            <a:extLst>
+              <a:ext uri="{FF2B5EF4-FFF2-40B4-BE49-F238E27FC236}">
+                <a16:creationId xmlns:a16="http://schemas.microsoft.com/office/drawing/2014/main" id="{0EA682E9-416F-3CCF-A3BF-00D6A90D76E0}"/>
               </a:ext>
             </a:extLst>
           </p:cNvPr>
@@ -2927,8 +2927,8 @@
         </p:blipFill>
         <p:spPr>
           <a:xfrm>
-            <a:off x="5010908" y="1954402"/>
-            <a:ext cx="2347163" cy="2949196"/>
+            <a:off x="4572000" y="1691489"/>
+            <a:ext cx="3093988" cy="3497883"/>
           </a:xfrm>
           <a:prstGeom prst="rect">
             <a:avLst/>

</xml_diff>